<commit_message>
Getting ready for PUGSUG demo.
</commit_message>
<xml_diff>
--- a/new_git.pptx
+++ b/new_git.pptx
@@ -124,10 +124,6 @@
 </p:presentation>
 </file>
 
-<file path=ppt/revisionInfo.xml><?xml version="1.0" encoding="utf-8"?>
-<p1510:revInfo xmlns:a="http://schemas.openxmlformats.org/drawingml/2006/main" xmlns:r="http://schemas.openxmlformats.org/officeDocument/2006/relationships" xmlns:p1510="http://schemas.microsoft.com/office/powerpoint/2015/10/main"/>
-</file>
-
 <file path=ppt/notesMasters/notesMaster1.xml><?xml version="1.0" encoding="utf-8"?>
 <p:notesMaster xmlns:a="http://schemas.openxmlformats.org/drawingml/2006/main" xmlns:r="http://schemas.openxmlformats.org/officeDocument/2006/relationships" xmlns:p="http://schemas.openxmlformats.org/presentationml/2006/main">
   <p:cSld>
@@ -210,7 +206,7 @@
           <a:p>
             <a:fld id="{10B76F35-FF3E-452A-BD9D-F67AAF676FCD}" type="datetimeFigureOut">
               <a:rPr lang="en-US" smtClean="0"/>
-              <a:t>10/24/2018</a:t>
+              <a:t>4/29/2019</a:t>
             </a:fld>
             <a:endParaRPr lang="en-US"/>
           </a:p>
@@ -2240,7 +2236,7 @@
           <a:p>
             <a:fld id="{553C09D2-78C2-4BE3-8DE8-0A40F67C6D14}" type="datetimeFigureOut">
               <a:rPr lang="en-US" smtClean="0"/>
-              <a:t>10/24/2018</a:t>
+              <a:t>4/29/2019</a:t>
             </a:fld>
             <a:endParaRPr lang="en-US"/>
           </a:p>
@@ -2438,7 +2434,7 @@
           <a:p>
             <a:fld id="{553C09D2-78C2-4BE3-8DE8-0A40F67C6D14}" type="datetimeFigureOut">
               <a:rPr lang="en-US" smtClean="0"/>
-              <a:t>10/24/2018</a:t>
+              <a:t>4/29/2019</a:t>
             </a:fld>
             <a:endParaRPr lang="en-US"/>
           </a:p>
@@ -2646,7 +2642,7 @@
           <a:p>
             <a:fld id="{553C09D2-78C2-4BE3-8DE8-0A40F67C6D14}" type="datetimeFigureOut">
               <a:rPr lang="en-US" smtClean="0"/>
-              <a:t>10/24/2018</a:t>
+              <a:t>4/29/2019</a:t>
             </a:fld>
             <a:endParaRPr lang="en-US"/>
           </a:p>
@@ -2844,7 +2840,7 @@
           <a:p>
             <a:fld id="{553C09D2-78C2-4BE3-8DE8-0A40F67C6D14}" type="datetimeFigureOut">
               <a:rPr lang="en-US" smtClean="0"/>
-              <a:t>10/24/2018</a:t>
+              <a:t>4/29/2019</a:t>
             </a:fld>
             <a:endParaRPr lang="en-US"/>
           </a:p>
@@ -3119,7 +3115,7 @@
           <a:p>
             <a:fld id="{553C09D2-78C2-4BE3-8DE8-0A40F67C6D14}" type="datetimeFigureOut">
               <a:rPr lang="en-US" smtClean="0"/>
-              <a:t>10/24/2018</a:t>
+              <a:t>4/29/2019</a:t>
             </a:fld>
             <a:endParaRPr lang="en-US"/>
           </a:p>
@@ -3384,7 +3380,7 @@
           <a:p>
             <a:fld id="{553C09D2-78C2-4BE3-8DE8-0A40F67C6D14}" type="datetimeFigureOut">
               <a:rPr lang="en-US" smtClean="0"/>
-              <a:t>10/24/2018</a:t>
+              <a:t>4/29/2019</a:t>
             </a:fld>
             <a:endParaRPr lang="en-US"/>
           </a:p>
@@ -3796,7 +3792,7 @@
           <a:p>
             <a:fld id="{553C09D2-78C2-4BE3-8DE8-0A40F67C6D14}" type="datetimeFigureOut">
               <a:rPr lang="en-US" smtClean="0"/>
-              <a:t>10/24/2018</a:t>
+              <a:t>4/29/2019</a:t>
             </a:fld>
             <a:endParaRPr lang="en-US"/>
           </a:p>
@@ -3937,7 +3933,7 @@
           <a:p>
             <a:fld id="{553C09D2-78C2-4BE3-8DE8-0A40F67C6D14}" type="datetimeFigureOut">
               <a:rPr lang="en-US" smtClean="0"/>
-              <a:t>10/24/2018</a:t>
+              <a:t>4/29/2019</a:t>
             </a:fld>
             <a:endParaRPr lang="en-US"/>
           </a:p>
@@ -4050,7 +4046,7 @@
           <a:p>
             <a:fld id="{553C09D2-78C2-4BE3-8DE8-0A40F67C6D14}" type="datetimeFigureOut">
               <a:rPr lang="en-US" smtClean="0"/>
-              <a:t>10/24/2018</a:t>
+              <a:t>4/29/2019</a:t>
             </a:fld>
             <a:endParaRPr lang="en-US"/>
           </a:p>
@@ -4361,7 +4357,7 @@
           <a:p>
             <a:fld id="{553C09D2-78C2-4BE3-8DE8-0A40F67C6D14}" type="datetimeFigureOut">
               <a:rPr lang="en-US" smtClean="0"/>
-              <a:t>10/24/2018</a:t>
+              <a:t>4/29/2019</a:t>
             </a:fld>
             <a:endParaRPr lang="en-US"/>
           </a:p>
@@ -4649,7 +4645,7 @@
           <a:p>
             <a:fld id="{553C09D2-78C2-4BE3-8DE8-0A40F67C6D14}" type="datetimeFigureOut">
               <a:rPr lang="en-US" smtClean="0"/>
-              <a:t>10/24/2018</a:t>
+              <a:t>4/29/2019</a:t>
             </a:fld>
             <a:endParaRPr lang="en-US"/>
           </a:p>
@@ -4890,7 +4886,7 @@
           <a:p>
             <a:fld id="{553C09D2-78C2-4BE3-8DE8-0A40F67C6D14}" type="datetimeFigureOut">
               <a:rPr lang="en-US" smtClean="0"/>
-              <a:t>10/24/2018</a:t>
+              <a:t>4/29/2019</a:t>
             </a:fld>
             <a:endParaRPr lang="en-US"/>
           </a:p>
@@ -5330,7 +5326,15 @@
           <a:p>
             <a:r>
               <a:rPr lang="en-US" dirty="0"/>
-              <a:t>Git for VDW Work</a:t>
+              <a:t>Git </a:t>
+            </a:r>
+            <a:r>
+              <a:rPr lang="en-US"/>
+              <a:t>for SAS </a:t>
+            </a:r>
+            <a:r>
+              <a:rPr lang="en-US" dirty="0"/>
+              <a:t>Work</a:t>
             </a:r>
           </a:p>
         </p:txBody>

</xml_diff>